<commit_message>
Added class 9 stuff.
</commit_message>
<xml_diff>
--- a/class_8/jquery_class_8.pptx
+++ b/class_8/jquery_class_8.pptx
@@ -4931,7 +4931,11 @@
             <a:pPr marL="0" indent="0"/>
             <a:r>
               <a:rPr lang="en-US" dirty="0" smtClean="0"/>
-              <a:t>Tabs Events/Methods</a:t>
+              <a:t>Sortable Events</a:t>
+            </a:r>
+            <a:r>
+              <a:rPr lang="en-US" dirty="0" smtClean="0"/>
+              <a:t>/Methods</a:t>
             </a:r>
             <a:endParaRPr lang="en-US" dirty="0"/>
           </a:p>

</xml_diff>